<commit_message>
Update Index presentation 1-12-2023-.pptx
</commit_message>
<xml_diff>
--- a/Index presentation 1-12-2023-.pptx
+++ b/Index presentation 1-12-2023-.pptx
@@ -8,6 +8,8 @@
     <p:sldId id="257" r:id="rId2"/>
     <p:sldId id="256" r:id="rId3"/>
     <p:sldId id="258" r:id="rId4"/>
+    <p:sldId id="259" r:id="rId5"/>
+    <p:sldId id="261" r:id="rId6"/>
   </p:sldIdLst>
   <p:sldSz cx="9144000" cy="6858000" type="screen4x3"/>
   <p:notesSz cx="6858000" cy="9144000"/>
@@ -106,6 +108,11 @@
       </a:defRPr>
     </a:lvl9pPr>
   </p:defaultTextStyle>
+  <p:extLst>
+    <p:ext uri="{EFAFB233-063F-42B5-8137-9DF3F51BA10A}">
+      <p15:sldGuideLst xmlns:p15="http://schemas.microsoft.com/office/powerpoint/2012/main"/>
+    </p:ext>
+  </p:extLst>
 </p:presentation>
 </file>
 
@@ -151,7 +158,7 @@
           </a:lstStyle>
           <a:p>
             <a:r>
-              <a:rPr lang="en-US" smtClean="0"/>
+              <a:rPr lang="en-US"/>
               <a:t>Click to edit Master title style</a:t>
             </a:r>
             <a:endParaRPr lang="en-US" dirty="0"/>
@@ -216,7 +223,7 @@
           </a:lstStyle>
           <a:p>
             <a:r>
-              <a:rPr lang="en-US" smtClean="0"/>
+              <a:rPr lang="en-US"/>
               <a:t>Click to edit Master subtitle style</a:t>
             </a:r>
             <a:endParaRPr lang="en-US" dirty="0"/>
@@ -334,7 +341,7 @@
           <a:lstStyle/>
           <a:p>
             <a:r>
-              <a:rPr lang="en-US" smtClean="0"/>
+              <a:rPr lang="en-US"/>
               <a:t>Click to edit Master title style</a:t>
             </a:r>
             <a:endParaRPr lang="en-US" dirty="0"/>
@@ -358,35 +365,35 @@
           <a:p>
             <a:pPr lvl="0"/>
             <a:r>
-              <a:rPr lang="en-US" smtClean="0"/>
+              <a:rPr lang="en-US"/>
               <a:t>Edit Master text styles</a:t>
             </a:r>
           </a:p>
           <a:p>
             <a:pPr lvl="1"/>
             <a:r>
-              <a:rPr lang="en-US" smtClean="0"/>
+              <a:rPr lang="en-US"/>
               <a:t>Second level</a:t>
             </a:r>
           </a:p>
           <a:p>
             <a:pPr lvl="2"/>
             <a:r>
-              <a:rPr lang="en-US" smtClean="0"/>
+              <a:rPr lang="en-US"/>
               <a:t>Third level</a:t>
             </a:r>
           </a:p>
           <a:p>
             <a:pPr lvl="3"/>
             <a:r>
-              <a:rPr lang="en-US" smtClean="0"/>
+              <a:rPr lang="en-US"/>
               <a:t>Fourth level</a:t>
             </a:r>
           </a:p>
           <a:p>
             <a:pPr lvl="4"/>
             <a:r>
-              <a:rPr lang="en-US" smtClean="0"/>
+              <a:rPr lang="en-US"/>
               <a:t>Fifth level</a:t>
             </a:r>
             <a:endParaRPr lang="en-US" dirty="0"/>
@@ -509,7 +516,7 @@
           <a:lstStyle/>
           <a:p>
             <a:r>
-              <a:rPr lang="en-US" smtClean="0"/>
+              <a:rPr lang="en-US"/>
               <a:t>Click to edit Master title style</a:t>
             </a:r>
             <a:endParaRPr lang="en-US" dirty="0"/>
@@ -538,35 +545,35 @@
           <a:p>
             <a:pPr lvl="0"/>
             <a:r>
-              <a:rPr lang="en-US" smtClean="0"/>
+              <a:rPr lang="en-US"/>
               <a:t>Edit Master text styles</a:t>
             </a:r>
           </a:p>
           <a:p>
             <a:pPr lvl="1"/>
             <a:r>
-              <a:rPr lang="en-US" smtClean="0"/>
+              <a:rPr lang="en-US"/>
               <a:t>Second level</a:t>
             </a:r>
           </a:p>
           <a:p>
             <a:pPr lvl="2"/>
             <a:r>
-              <a:rPr lang="en-US" smtClean="0"/>
+              <a:rPr lang="en-US"/>
               <a:t>Third level</a:t>
             </a:r>
           </a:p>
           <a:p>
             <a:pPr lvl="3"/>
             <a:r>
-              <a:rPr lang="en-US" smtClean="0"/>
+              <a:rPr lang="en-US"/>
               <a:t>Fourth level</a:t>
             </a:r>
           </a:p>
           <a:p>
             <a:pPr lvl="4"/>
             <a:r>
-              <a:rPr lang="en-US" smtClean="0"/>
+              <a:rPr lang="en-US"/>
               <a:t>Fifth level</a:t>
             </a:r>
             <a:endParaRPr lang="en-US" dirty="0"/>
@@ -684,7 +691,7 @@
           <a:lstStyle/>
           <a:p>
             <a:r>
-              <a:rPr lang="en-US" smtClean="0"/>
+              <a:rPr lang="en-US"/>
               <a:t>Click to edit Master title style</a:t>
             </a:r>
             <a:endParaRPr lang="en-US" dirty="0"/>
@@ -708,35 +715,35 @@
           <a:p>
             <a:pPr lvl="0"/>
             <a:r>
-              <a:rPr lang="en-US" smtClean="0"/>
+              <a:rPr lang="en-US"/>
               <a:t>Edit Master text styles</a:t>
             </a:r>
           </a:p>
           <a:p>
             <a:pPr lvl="1"/>
             <a:r>
-              <a:rPr lang="en-US" smtClean="0"/>
+              <a:rPr lang="en-US"/>
               <a:t>Second level</a:t>
             </a:r>
           </a:p>
           <a:p>
             <a:pPr lvl="2"/>
             <a:r>
-              <a:rPr lang="en-US" smtClean="0"/>
+              <a:rPr lang="en-US"/>
               <a:t>Third level</a:t>
             </a:r>
           </a:p>
           <a:p>
             <a:pPr lvl="3"/>
             <a:r>
-              <a:rPr lang="en-US" smtClean="0"/>
+              <a:rPr lang="en-US"/>
               <a:t>Fourth level</a:t>
             </a:r>
           </a:p>
           <a:p>
             <a:pPr lvl="4"/>
             <a:r>
-              <a:rPr lang="en-US" smtClean="0"/>
+              <a:rPr lang="en-US"/>
               <a:t>Fifth level</a:t>
             </a:r>
             <a:endParaRPr lang="en-US" dirty="0"/>
@@ -863,7 +870,7 @@
           </a:lstStyle>
           <a:p>
             <a:r>
-              <a:rPr lang="en-US" smtClean="0"/>
+              <a:rPr lang="en-US"/>
               <a:t>Click to edit Master title style</a:t>
             </a:r>
             <a:endParaRPr lang="en-US" dirty="0"/>
@@ -981,7 +988,7 @@
           <a:p>
             <a:pPr lvl="0"/>
             <a:r>
-              <a:rPr lang="en-US" smtClean="0"/>
+              <a:rPr lang="en-US"/>
               <a:t>Edit Master text styles</a:t>
             </a:r>
           </a:p>
@@ -1098,7 +1105,7 @@
           <a:lstStyle/>
           <a:p>
             <a:r>
-              <a:rPr lang="en-US" smtClean="0"/>
+              <a:rPr lang="en-US"/>
               <a:t>Click to edit Master title style</a:t>
             </a:r>
             <a:endParaRPr lang="en-US" dirty="0"/>
@@ -1127,35 +1134,35 @@
           <a:p>
             <a:pPr lvl="0"/>
             <a:r>
-              <a:rPr lang="en-US" smtClean="0"/>
+              <a:rPr lang="en-US"/>
               <a:t>Edit Master text styles</a:t>
             </a:r>
           </a:p>
           <a:p>
             <a:pPr lvl="1"/>
             <a:r>
-              <a:rPr lang="en-US" smtClean="0"/>
+              <a:rPr lang="en-US"/>
               <a:t>Second level</a:t>
             </a:r>
           </a:p>
           <a:p>
             <a:pPr lvl="2"/>
             <a:r>
-              <a:rPr lang="en-US" smtClean="0"/>
+              <a:rPr lang="en-US"/>
               <a:t>Third level</a:t>
             </a:r>
           </a:p>
           <a:p>
             <a:pPr lvl="3"/>
             <a:r>
-              <a:rPr lang="en-US" smtClean="0"/>
+              <a:rPr lang="en-US"/>
               <a:t>Fourth level</a:t>
             </a:r>
           </a:p>
           <a:p>
             <a:pPr lvl="4"/>
             <a:r>
-              <a:rPr lang="en-US" smtClean="0"/>
+              <a:rPr lang="en-US"/>
               <a:t>Fifth level</a:t>
             </a:r>
             <a:endParaRPr lang="en-US" dirty="0"/>
@@ -1184,35 +1191,35 @@
           <a:p>
             <a:pPr lvl="0"/>
             <a:r>
-              <a:rPr lang="en-US" smtClean="0"/>
+              <a:rPr lang="en-US"/>
               <a:t>Edit Master text styles</a:t>
             </a:r>
           </a:p>
           <a:p>
             <a:pPr lvl="1"/>
             <a:r>
-              <a:rPr lang="en-US" smtClean="0"/>
+              <a:rPr lang="en-US"/>
               <a:t>Second level</a:t>
             </a:r>
           </a:p>
           <a:p>
             <a:pPr lvl="2"/>
             <a:r>
-              <a:rPr lang="en-US" smtClean="0"/>
+              <a:rPr lang="en-US"/>
               <a:t>Third level</a:t>
             </a:r>
           </a:p>
           <a:p>
             <a:pPr lvl="3"/>
             <a:r>
-              <a:rPr lang="en-US" smtClean="0"/>
+              <a:rPr lang="en-US"/>
               <a:t>Fourth level</a:t>
             </a:r>
           </a:p>
           <a:p>
             <a:pPr lvl="4"/>
             <a:r>
-              <a:rPr lang="en-US" smtClean="0"/>
+              <a:rPr lang="en-US"/>
               <a:t>Fifth level</a:t>
             </a:r>
             <a:endParaRPr lang="en-US" dirty="0"/>
@@ -1335,7 +1342,7 @@
           <a:lstStyle/>
           <a:p>
             <a:r>
-              <a:rPr lang="en-US" smtClean="0"/>
+              <a:rPr lang="en-US"/>
               <a:t>Click to edit Master title style</a:t>
             </a:r>
             <a:endParaRPr lang="en-US" dirty="0"/>
@@ -1401,7 +1408,7 @@
           <a:p>
             <a:pPr lvl="0"/>
             <a:r>
-              <a:rPr lang="en-US" smtClean="0"/>
+              <a:rPr lang="en-US"/>
               <a:t>Edit Master text styles</a:t>
             </a:r>
           </a:p>
@@ -1429,35 +1436,35 @@
           <a:p>
             <a:pPr lvl="0"/>
             <a:r>
-              <a:rPr lang="en-US" smtClean="0"/>
+              <a:rPr lang="en-US"/>
               <a:t>Edit Master text styles</a:t>
             </a:r>
           </a:p>
           <a:p>
             <a:pPr lvl="1"/>
             <a:r>
-              <a:rPr lang="en-US" smtClean="0"/>
+              <a:rPr lang="en-US"/>
               <a:t>Second level</a:t>
             </a:r>
           </a:p>
           <a:p>
             <a:pPr lvl="2"/>
             <a:r>
-              <a:rPr lang="en-US" smtClean="0"/>
+              <a:rPr lang="en-US"/>
               <a:t>Third level</a:t>
             </a:r>
           </a:p>
           <a:p>
             <a:pPr lvl="3"/>
             <a:r>
-              <a:rPr lang="en-US" smtClean="0"/>
+              <a:rPr lang="en-US"/>
               <a:t>Fourth level</a:t>
             </a:r>
           </a:p>
           <a:p>
             <a:pPr lvl="4"/>
             <a:r>
-              <a:rPr lang="en-US" smtClean="0"/>
+              <a:rPr lang="en-US"/>
               <a:t>Fifth level</a:t>
             </a:r>
             <a:endParaRPr lang="en-US" dirty="0"/>
@@ -1523,7 +1530,7 @@
           <a:p>
             <a:pPr lvl="0"/>
             <a:r>
-              <a:rPr lang="en-US" smtClean="0"/>
+              <a:rPr lang="en-US"/>
               <a:t>Edit Master text styles</a:t>
             </a:r>
           </a:p>
@@ -1551,35 +1558,35 @@
           <a:p>
             <a:pPr lvl="0"/>
             <a:r>
-              <a:rPr lang="en-US" smtClean="0"/>
+              <a:rPr lang="en-US"/>
               <a:t>Edit Master text styles</a:t>
             </a:r>
           </a:p>
           <a:p>
             <a:pPr lvl="1"/>
             <a:r>
-              <a:rPr lang="en-US" smtClean="0"/>
+              <a:rPr lang="en-US"/>
               <a:t>Second level</a:t>
             </a:r>
           </a:p>
           <a:p>
             <a:pPr lvl="2"/>
             <a:r>
-              <a:rPr lang="en-US" smtClean="0"/>
+              <a:rPr lang="en-US"/>
               <a:t>Third level</a:t>
             </a:r>
           </a:p>
           <a:p>
             <a:pPr lvl="3"/>
             <a:r>
-              <a:rPr lang="en-US" smtClean="0"/>
+              <a:rPr lang="en-US"/>
               <a:t>Fourth level</a:t>
             </a:r>
           </a:p>
           <a:p>
             <a:pPr lvl="4"/>
             <a:r>
-              <a:rPr lang="en-US" smtClean="0"/>
+              <a:rPr lang="en-US"/>
               <a:t>Fifth level</a:t>
             </a:r>
             <a:endParaRPr lang="en-US" dirty="0"/>
@@ -1697,7 +1704,7 @@
           <a:lstStyle/>
           <a:p>
             <a:r>
-              <a:rPr lang="en-US" smtClean="0"/>
+              <a:rPr lang="en-US"/>
               <a:t>Click to edit Master title style</a:t>
             </a:r>
             <a:endParaRPr lang="en-US" dirty="0"/>
@@ -1919,7 +1926,7 @@
           </a:lstStyle>
           <a:p>
             <a:r>
-              <a:rPr lang="en-US" smtClean="0"/>
+              <a:rPr lang="en-US"/>
               <a:t>Click to edit Master title style</a:t>
             </a:r>
             <a:endParaRPr lang="en-US" dirty="0"/>
@@ -1976,35 +1983,35 @@
           <a:p>
             <a:pPr lvl="0"/>
             <a:r>
-              <a:rPr lang="en-US" smtClean="0"/>
+              <a:rPr lang="en-US"/>
               <a:t>Edit Master text styles</a:t>
             </a:r>
           </a:p>
           <a:p>
             <a:pPr lvl="1"/>
             <a:r>
-              <a:rPr lang="en-US" smtClean="0"/>
+              <a:rPr lang="en-US"/>
               <a:t>Second level</a:t>
             </a:r>
           </a:p>
           <a:p>
             <a:pPr lvl="2"/>
             <a:r>
-              <a:rPr lang="en-US" smtClean="0"/>
+              <a:rPr lang="en-US"/>
               <a:t>Third level</a:t>
             </a:r>
           </a:p>
           <a:p>
             <a:pPr lvl="3"/>
             <a:r>
-              <a:rPr lang="en-US" smtClean="0"/>
+              <a:rPr lang="en-US"/>
               <a:t>Fourth level</a:t>
             </a:r>
           </a:p>
           <a:p>
             <a:pPr lvl="4"/>
             <a:r>
-              <a:rPr lang="en-US" smtClean="0"/>
+              <a:rPr lang="en-US"/>
               <a:t>Fifth level</a:t>
             </a:r>
             <a:endParaRPr lang="en-US" dirty="0"/>
@@ -2070,7 +2077,7 @@
           <a:p>
             <a:pPr lvl="0"/>
             <a:r>
-              <a:rPr lang="en-US" smtClean="0"/>
+              <a:rPr lang="en-US"/>
               <a:t>Edit Master text styles</a:t>
             </a:r>
           </a:p>
@@ -2196,7 +2203,7 @@
           </a:lstStyle>
           <a:p>
             <a:r>
-              <a:rPr lang="en-US" smtClean="0"/>
+              <a:rPr lang="en-US"/>
               <a:t>Click to edit Master title style</a:t>
             </a:r>
             <a:endParaRPr lang="en-US" dirty="0"/>
@@ -2261,7 +2268,7 @@
           </a:lstStyle>
           <a:p>
             <a:r>
-              <a:rPr lang="en-US" smtClean="0"/>
+              <a:rPr lang="en-US"/>
               <a:t>Click icon to add picture</a:t>
             </a:r>
             <a:endParaRPr lang="en-US" dirty="0"/>
@@ -2327,7 +2334,7 @@
           <a:p>
             <a:pPr lvl="0"/>
             <a:r>
-              <a:rPr lang="en-US" smtClean="0"/>
+              <a:rPr lang="en-US"/>
               <a:t>Edit Master text styles</a:t>
             </a:r>
           </a:p>
@@ -2459,7 +2466,7 @@
           <a:lstStyle/>
           <a:p>
             <a:r>
-              <a:rPr lang="en-US" smtClean="0"/>
+              <a:rPr lang="en-US"/>
               <a:t>Click to edit Master title style</a:t>
             </a:r>
             <a:endParaRPr lang="en-US" dirty="0"/>
@@ -2493,35 +2500,35 @@
           <a:p>
             <a:pPr lvl="0"/>
             <a:r>
-              <a:rPr lang="en-US" smtClean="0"/>
+              <a:rPr lang="en-US"/>
               <a:t>Edit Master text styles</a:t>
             </a:r>
           </a:p>
           <a:p>
             <a:pPr lvl="1"/>
             <a:r>
-              <a:rPr lang="en-US" smtClean="0"/>
+              <a:rPr lang="en-US"/>
               <a:t>Second level</a:t>
             </a:r>
           </a:p>
           <a:p>
             <a:pPr lvl="2"/>
             <a:r>
-              <a:rPr lang="en-US" smtClean="0"/>
+              <a:rPr lang="en-US"/>
               <a:t>Third level</a:t>
             </a:r>
           </a:p>
           <a:p>
             <a:pPr lvl="3"/>
             <a:r>
-              <a:rPr lang="en-US" smtClean="0"/>
+              <a:rPr lang="en-US"/>
               <a:t>Fourth level</a:t>
             </a:r>
           </a:p>
           <a:p>
             <a:pPr lvl="4"/>
             <a:r>
-              <a:rPr lang="en-US" smtClean="0"/>
+              <a:rPr lang="en-US"/>
               <a:t>Fifth level</a:t>
             </a:r>
             <a:endParaRPr lang="en-US" dirty="0"/>
@@ -2984,18 +2991,9 @@
           <a:lstStyle/>
           <a:p>
             <a:r>
-              <a:rPr lang="en-US" b="1" dirty="0" smtClean="0"/>
-              <a:t>NEP </a:t>
-            </a:r>
-            <a:r>
               <a:rPr lang="en-US" b="1" dirty="0"/>
-              <a:t>10km </a:t>
-            </a:r>
-            <a:r>
-              <a:rPr lang="en-US" b="1" dirty="0" smtClean="0"/>
-              <a:t>model (monthly)</a:t>
-            </a:r>
-            <a:endParaRPr lang="en-US" b="1" dirty="0"/>
+              <a:t>NEP 10km model (monthly)</a:t>
+            </a:r>
           </a:p>
         </p:txBody>
       </p:sp>
@@ -3012,79 +3010,42 @@
         <p:spPr/>
         <p:txBody>
           <a:bodyPr>
-            <a:normAutofit fontScale="92500" lnSpcReduction="10000"/>
+            <a:normAutofit fontScale="92500" lnSpcReduction="20000"/>
           </a:bodyPr>
           <a:lstStyle/>
           <a:p>
             <a:pPr lvl="0"/>
             <a:r>
-              <a:rPr lang="en-US" b="1" dirty="0" smtClean="0"/>
-              <a:t>ROMS </a:t>
-            </a:r>
-            <a:r>
               <a:rPr lang="en-US" b="1" dirty="0"/>
-              <a:t>r</a:t>
-            </a:r>
-            <a:r>
-              <a:rPr lang="en-US" b="1" dirty="0" smtClean="0"/>
-              <a:t>uns:</a:t>
+              <a:t>ROMS runs:</a:t>
             </a:r>
           </a:p>
           <a:p>
             <a:pPr lvl="1"/>
             <a:r>
-              <a:rPr lang="en-US" dirty="0" err="1"/>
-              <a:t>H</a:t>
-            </a:r>
-            <a:r>
-              <a:rPr lang="en-US" dirty="0" err="1" smtClean="0"/>
-              <a:t>indcast</a:t>
-            </a:r>
-            <a:endParaRPr lang="en-US" dirty="0" smtClean="0"/>
+              <a:rPr lang="en-US" dirty="0"/>
+              <a:t>Hindcast (2000-2020)</a:t>
+            </a:r>
           </a:p>
           <a:p>
             <a:pPr lvl="1"/>
             <a:r>
-              <a:rPr lang="en-US" dirty="0" smtClean="0"/>
-              <a:t>“Historical</a:t>
-            </a:r>
-            <a:r>
               <a:rPr lang="en-US" dirty="0"/>
-              <a:t>" </a:t>
-            </a:r>
-            <a:r>
-              <a:rPr lang="en-US" dirty="0" smtClean="0"/>
-              <a:t>run</a:t>
+              <a:t>“Historical" run (1980-2014)</a:t>
             </a:r>
           </a:p>
           <a:p>
             <a:pPr lvl="1"/>
             <a:r>
-              <a:rPr lang="en-US" dirty="0" smtClean="0"/>
-              <a:t>GFDL </a:t>
-            </a:r>
-            <a:r>
               <a:rPr lang="en-US" dirty="0"/>
-              <a:t>ssp126 </a:t>
-            </a:r>
-            <a:r>
-              <a:rPr lang="en-US" dirty="0" smtClean="0"/>
-              <a:t>projection</a:t>
+              <a:t>GFDL ssp126 projection (2015-2099)</a:t>
             </a:r>
           </a:p>
           <a:p>
             <a:pPr lvl="1"/>
             <a:r>
-              <a:rPr lang="en-US" dirty="0" smtClean="0"/>
-              <a:t>GFDL </a:t>
-            </a:r>
-            <a:r>
               <a:rPr lang="en-US" dirty="0"/>
-              <a:t>ssp585 </a:t>
-            </a:r>
-            <a:r>
-              <a:rPr lang="en-US" dirty="0" smtClean="0"/>
-              <a:t>projection</a:t>
+              <a:t>GFDL ssp585 projection (2015-2099)</a:t>
             </a:r>
           </a:p>
           <a:p>
@@ -3101,58 +3062,29 @@
             <a:pPr lvl="1"/>
             <a:r>
               <a:rPr lang="en-US" dirty="0"/>
-              <a:t>Surface (from 0 to 10 </a:t>
-            </a:r>
-            <a:r>
-              <a:rPr lang="en-US" dirty="0" smtClean="0"/>
-              <a:t>m)</a:t>
-            </a:r>
+              <a:t>Surface (from 0 to 10 m)</a:t>
+            </a:r>
+          </a:p>
+          <a:p>
+            <a:pPr lvl="1"/>
+            <a:r>
+              <a:rPr lang="en-US" dirty="0"/>
+              <a:t>Bottom (bottom to 10 m from bottom)</a:t>
+            </a:r>
+          </a:p>
+          <a:p>
+            <a:pPr lvl="1"/>
+            <a:r>
+              <a:rPr lang="en-US" dirty="0"/>
+              <a:t>Midwater (10 m to 10 m from bottom)</a:t>
+            </a:r>
+          </a:p>
+          <a:p>
             <a:endParaRPr lang="en-US" dirty="0"/>
           </a:p>
           <a:p>
             <a:pPr lvl="1"/>
-            <a:r>
-              <a:rPr lang="en-US" dirty="0"/>
-              <a:t>Bottom </a:t>
-            </a:r>
-            <a:r>
-              <a:rPr lang="en-US" dirty="0" smtClean="0"/>
-              <a:t>(bottom </a:t>
-            </a:r>
-            <a:r>
-              <a:rPr lang="en-US" dirty="0"/>
-              <a:t>to 10 m from bottom)</a:t>
-            </a:r>
-          </a:p>
-          <a:p>
-            <a:pPr lvl="1"/>
-            <a:r>
-              <a:rPr lang="en-US" dirty="0"/>
-              <a:t>Midwater </a:t>
-            </a:r>
-            <a:r>
-              <a:rPr lang="en-US" dirty="0" smtClean="0"/>
-              <a:t>(10 </a:t>
-            </a:r>
-            <a:r>
-              <a:rPr lang="en-US" dirty="0"/>
-              <a:t>m </a:t>
-            </a:r>
-            <a:r>
-              <a:rPr lang="en-US" dirty="0" smtClean="0"/>
-              <a:t>to </a:t>
-            </a:r>
-            <a:r>
-              <a:rPr lang="en-US" dirty="0"/>
-              <a:t>10 m from bottom)</a:t>
-            </a:r>
-          </a:p>
-          <a:p>
-            <a:endParaRPr lang="en-US" dirty="0" smtClean="0"/>
-          </a:p>
-          <a:p>
-            <a:pPr lvl="1"/>
-            <a:endParaRPr lang="en-US" dirty="0" smtClean="0"/>
+            <a:endParaRPr lang="en-US" dirty="0"/>
           </a:p>
           <a:p>
             <a:pPr lvl="1"/>
@@ -3208,14 +3140,14 @@
           <a:p>
             <a:pPr lvl="0"/>
             <a:r>
-              <a:rPr lang="en-US" b="1" dirty="0" smtClean="0"/>
+              <a:rPr lang="en-US" b="1" dirty="0"/>
               <a:t>Each management area to 1,000 m </a:t>
             </a:r>
             <a:r>
-              <a:rPr lang="en-US" b="1" dirty="0" err="1" smtClean="0"/>
+              <a:rPr lang="en-US" b="1" dirty="0" err="1"/>
               <a:t>isobath</a:t>
             </a:r>
-            <a:endParaRPr lang="en-US" b="1" dirty="0" smtClean="0"/>
+            <a:endParaRPr lang="en-US" b="1" dirty="0"/>
           </a:p>
         </p:txBody>
       </p:sp>
@@ -3265,10 +3197,9 @@
           <a:lstStyle/>
           <a:p>
             <a:r>
-              <a:rPr lang="en-US" b="1" dirty="0" smtClean="0"/>
+              <a:rPr lang="en-US" b="1" dirty="0"/>
               <a:t>GOA Indices</a:t>
             </a:r>
-            <a:endParaRPr lang="en-US" b="1" dirty="0"/>
           </a:p>
         </p:txBody>
       </p:sp>
@@ -3284,19 +3215,39 @@
         </p:nvSpPr>
         <p:spPr/>
         <p:txBody>
-          <a:bodyPr/>
+          <a:bodyPr>
+            <a:normAutofit fontScale="92500"/>
+          </a:bodyPr>
           <a:lstStyle/>
           <a:p>
             <a:r>
               <a:rPr lang="en-US" dirty="0"/>
-              <a:t>Summed across depth then averaged across area</a:t>
-            </a:r>
-          </a:p>
-          <a:p>
+              <a:t>Vertically interpolating variables at each rho point (1 m intervals)</a:t>
+            </a:r>
+          </a:p>
+          <a:p>
+            <a:r>
+              <a:rPr lang="en-US" dirty="0"/>
+              <a:t>Summarizing (1) vertically and (2) horizontally</a:t>
+            </a:r>
+          </a:p>
+          <a:p>
+            <a:pPr lvl="1"/>
             <a:r>
               <a:rPr lang="en-US" dirty="0"/>
               <a:t>Averaged across depth and area</a:t>
             </a:r>
+          </a:p>
+          <a:p>
+            <a:pPr lvl="1"/>
+            <a:r>
+              <a:rPr lang="en-US" dirty="0"/>
+              <a:t>Summed across depth then averaged across area (to get standing stock biomass estimates)</a:t>
+            </a:r>
+          </a:p>
+          <a:p>
+            <a:pPr lvl="1"/>
+            <a:endParaRPr lang="en-US" dirty="0"/>
           </a:p>
           <a:p>
             <a:endParaRPr lang="en-US" dirty="0"/>
@@ -5011,8 +4962,8 @@
           <a:chExt cx="0" cy="0"/>
         </a:xfrm>
       </p:grpSpPr>
-      <mc:AlternateContent xmlns:mc="http://schemas.openxmlformats.org/markup-compatibility/2006">
-        <mc:Choice xmlns:a14="http://schemas.microsoft.com/office/drawing/2010/main" Requires="a14">
+      <mc:AlternateContent xmlns:mc="http://schemas.openxmlformats.org/markup-compatibility/2006" xmlns:a14="http://schemas.microsoft.com/office/drawing/2010/main">
+        <mc:Choice Requires="a14">
           <p:sp>
             <p:nvSpPr>
               <p:cNvPr id="6" name="Content Placeholder 5"/>
@@ -5042,40 +4993,54 @@
                       <m:sSubSup>
                         <m:sSubSupPr>
                           <m:ctrlPr>
-                            <a:rPr lang="en-US" i="1" smtClean="0"/>
+                            <a:rPr lang="en-US" i="1" smtClean="0">
+                              <a:latin typeface="Cambria Math" panose="02040503050406030204" pitchFamily="18" charset="0"/>
+                            </a:rPr>
                           </m:ctrlPr>
                         </m:sSubSupPr>
                         <m:e>
                           <m:r>
-                            <a:rPr lang="en-US" i="1"/>
+                            <a:rPr lang="en-US" i="1">
+                              <a:latin typeface="Cambria Math" panose="02040503050406030204" pitchFamily="18" charset="0"/>
+                            </a:rPr>
                             <m:t>𝑥</m:t>
                           </m:r>
                         </m:e>
                         <m:sub>
                           <m:r>
-                            <a:rPr lang="en-US" i="1"/>
+                            <a:rPr lang="en-US" i="1">
+                              <a:latin typeface="Cambria Math" panose="02040503050406030204" pitchFamily="18" charset="0"/>
+                            </a:rPr>
                             <m:t>𝑦</m:t>
                           </m:r>
                         </m:sub>
                         <m:sup>
                           <m:r>
-                            <a:rPr lang="en-US" i="1"/>
+                            <a:rPr lang="en-US" i="1">
+                              <a:latin typeface="Cambria Math" panose="02040503050406030204" pitchFamily="18" charset="0"/>
+                            </a:rPr>
                             <m:t>𝑝𝑟𝑜𝑗</m:t>
                           </m:r>
                           <m:r>
-                            <a:rPr lang="en-US" i="1"/>
+                            <a:rPr lang="en-US" i="1">
+                              <a:latin typeface="Cambria Math" panose="02040503050406030204" pitchFamily="18" charset="0"/>
+                            </a:rPr>
                             <m:t>′</m:t>
                           </m:r>
                         </m:sup>
                       </m:sSubSup>
                       <m:r>
-                        <a:rPr lang="en-US" i="1"/>
+                        <a:rPr lang="en-US" i="1">
+                          <a:latin typeface="Cambria Math" panose="02040503050406030204" pitchFamily="18" charset="0"/>
+                        </a:rPr>
                         <m:t>=</m:t>
                       </m:r>
                       <m:sSubSup>
                         <m:sSubSupPr>
                           <m:ctrlPr>
-                            <a:rPr lang="en-US" i="1"/>
+                            <a:rPr lang="en-US" i="1">
+                              <a:latin typeface="Cambria Math" panose="02040503050406030204" pitchFamily="18" charset="0"/>
+                            </a:rPr>
                           </m:ctrlPr>
                         </m:sSubSupPr>
                         <m:e>
@@ -5083,12 +5048,16 @@
                             <m:accPr>
                               <m:chr m:val="̅"/>
                               <m:ctrlPr>
-                                <a:rPr lang="en-US" i="1"/>
+                                <a:rPr lang="en-US" i="1">
+                                  <a:latin typeface="Cambria Math" panose="02040503050406030204" pitchFamily="18" charset="0"/>
+                                </a:rPr>
                               </m:ctrlPr>
                             </m:accPr>
                             <m:e>
                               <m:r>
-                                <a:rPr lang="en-US" i="1"/>
+                                <a:rPr lang="en-US" i="1">
+                                  <a:latin typeface="Cambria Math" panose="02040503050406030204" pitchFamily="18" charset="0"/>
+                                </a:rPr>
                                 <m:t>𝑥</m:t>
                               </m:r>
                             </m:e>
@@ -5096,56 +5065,74 @@
                         </m:e>
                         <m:sub>
                           <m:r>
-                            <a:rPr lang="en-US" i="1"/>
+                            <a:rPr lang="en-US" i="1">
+                              <a:latin typeface="Cambria Math" panose="02040503050406030204" pitchFamily="18" charset="0"/>
+                            </a:rPr>
                             <m:t>𝑇</m:t>
                           </m:r>
                         </m:sub>
                         <m:sup>
                           <m:r>
-                            <a:rPr lang="en-US" i="1"/>
+                            <a:rPr lang="en-US" i="1">
+                              <a:latin typeface="Cambria Math" panose="02040503050406030204" pitchFamily="18" charset="0"/>
+                            </a:rPr>
                             <m:t>h𝑖𝑛𝑑</m:t>
                           </m:r>
                         </m:sup>
                       </m:sSubSup>
                       <m:r>
-                        <a:rPr lang="en-US" i="1"/>
+                        <a:rPr lang="en-US" i="1">
+                          <a:latin typeface="Cambria Math" panose="02040503050406030204" pitchFamily="18" charset="0"/>
+                        </a:rPr>
                         <m:t>+</m:t>
                       </m:r>
                       <m:d>
                         <m:dPr>
                           <m:ctrlPr>
-                            <a:rPr lang="en-US" i="1"/>
+                            <a:rPr lang="en-US" i="1">
+                              <a:latin typeface="Cambria Math" panose="02040503050406030204" pitchFamily="18" charset="0"/>
+                            </a:rPr>
                           </m:ctrlPr>
                         </m:dPr>
                         <m:e>
                           <m:f>
                             <m:fPr>
                               <m:ctrlPr>
-                                <a:rPr lang="en-US" i="1"/>
+                                <a:rPr lang="en-US" i="1">
+                                  <a:latin typeface="Cambria Math" panose="02040503050406030204" pitchFamily="18" charset="0"/>
+                                </a:rPr>
                               </m:ctrlPr>
                             </m:fPr>
                             <m:num>
                               <m:sSubSup>
                                 <m:sSubSupPr>
                                   <m:ctrlPr>
-                                    <a:rPr lang="en-US" i="1"/>
+                                    <a:rPr lang="en-US" i="1">
+                                      <a:latin typeface="Cambria Math" panose="02040503050406030204" pitchFamily="18" charset="0"/>
+                                    </a:rPr>
                                   </m:ctrlPr>
                                 </m:sSubSupPr>
                                 <m:e>
                                   <m:r>
-                                    <a:rPr lang="en-US" i="1"/>
+                                    <a:rPr lang="en-US" i="1">
+                                      <a:latin typeface="Cambria Math" panose="02040503050406030204" pitchFamily="18" charset="0"/>
+                                    </a:rPr>
                                     <m:t>𝜎</m:t>
                                   </m:r>
                                 </m:e>
                                 <m:sub>
                                   <m:r>
-                                    <a:rPr lang="en-US" i="1"/>
+                                    <a:rPr lang="en-US" i="1">
+                                      <a:latin typeface="Cambria Math" panose="02040503050406030204" pitchFamily="18" charset="0"/>
+                                    </a:rPr>
                                     <m:t>𝑇</m:t>
                                   </m:r>
                                 </m:sub>
                                 <m:sup>
                                   <m:r>
-                                    <a:rPr lang="en-US" i="1"/>
+                                    <a:rPr lang="en-US" i="1">
+                                      <a:latin typeface="Cambria Math" panose="02040503050406030204" pitchFamily="18" charset="0"/>
+                                    </a:rPr>
                                     <m:t>h𝑖𝑛𝑑</m:t>
                                   </m:r>
                                 </m:sup>
@@ -5155,24 +5142,32 @@
                               <m:sSubSup>
                                 <m:sSubSupPr>
                                   <m:ctrlPr>
-                                    <a:rPr lang="en-US" i="1"/>
+                                    <a:rPr lang="en-US" i="1">
+                                      <a:latin typeface="Cambria Math" panose="02040503050406030204" pitchFamily="18" charset="0"/>
+                                    </a:rPr>
                                   </m:ctrlPr>
                                 </m:sSubSupPr>
                                 <m:e>
                                   <m:r>
-                                    <a:rPr lang="en-US" i="1"/>
+                                    <a:rPr lang="en-US" i="1">
+                                      <a:latin typeface="Cambria Math" panose="02040503050406030204" pitchFamily="18" charset="0"/>
+                                    </a:rPr>
                                     <m:t>𝜎</m:t>
                                   </m:r>
                                 </m:e>
                                 <m:sub>
                                   <m:r>
-                                    <a:rPr lang="en-US" i="1"/>
+                                    <a:rPr lang="en-US" i="1">
+                                      <a:latin typeface="Cambria Math" panose="02040503050406030204" pitchFamily="18" charset="0"/>
+                                    </a:rPr>
                                     <m:t>𝑇</m:t>
                                   </m:r>
                                 </m:sub>
                                 <m:sup>
                                   <m:r>
-                                    <a:rPr lang="en-US" i="1"/>
+                                    <a:rPr lang="en-US" i="1">
+                                      <a:latin typeface="Cambria Math" panose="02040503050406030204" pitchFamily="18" charset="0"/>
+                                    </a:rPr>
                                     <m:t>h𝑖𝑠𝑡</m:t>
                                   </m:r>
                                 </m:sup>
@@ -5180,49 +5175,65 @@
                             </m:den>
                           </m:f>
                           <m:r>
-                            <a:rPr lang="en-US" i="1"/>
+                            <a:rPr lang="en-US" i="1">
+                              <a:latin typeface="Cambria Math" panose="02040503050406030204" pitchFamily="18" charset="0"/>
+                            </a:rPr>
                             <m:t>∗</m:t>
                           </m:r>
                           <m:d>
                             <m:dPr>
                               <m:ctrlPr>
-                                <a:rPr lang="en-US" i="1"/>
+                                <a:rPr lang="en-US" i="1">
+                                  <a:latin typeface="Cambria Math" panose="02040503050406030204" pitchFamily="18" charset="0"/>
+                                </a:rPr>
                               </m:ctrlPr>
                             </m:dPr>
                             <m:e>
                               <m:sSubSup>
                                 <m:sSubSupPr>
                                   <m:ctrlPr>
-                                    <a:rPr lang="en-US" i="1"/>
+                                    <a:rPr lang="en-US" i="1">
+                                      <a:latin typeface="Cambria Math" panose="02040503050406030204" pitchFamily="18" charset="0"/>
+                                    </a:rPr>
                                   </m:ctrlPr>
                                 </m:sSubSupPr>
                                 <m:e>
                                   <m:r>
-                                    <a:rPr lang="en-US" i="1"/>
+                                    <a:rPr lang="en-US" i="1">
+                                      <a:latin typeface="Cambria Math" panose="02040503050406030204" pitchFamily="18" charset="0"/>
+                                    </a:rPr>
                                     <m:t>𝑥</m:t>
                                   </m:r>
                                 </m:e>
                                 <m:sub>
                                   <m:r>
-                                    <a:rPr lang="en-US" i="1"/>
+                                    <a:rPr lang="en-US" i="1">
+                                      <a:latin typeface="Cambria Math" panose="02040503050406030204" pitchFamily="18" charset="0"/>
+                                    </a:rPr>
                                     <m:t>𝑦</m:t>
                                   </m:r>
                                 </m:sub>
                                 <m:sup>
                                   <m:r>
-                                    <a:rPr lang="en-US" i="1"/>
+                                    <a:rPr lang="en-US" i="1">
+                                      <a:latin typeface="Cambria Math" panose="02040503050406030204" pitchFamily="18" charset="0"/>
+                                    </a:rPr>
                                     <m:t>𝑝𝑟𝑜𝑗</m:t>
                                   </m:r>
                                 </m:sup>
                               </m:sSubSup>
                               <m:r>
-                                <a:rPr lang="en-US" i="1"/>
+                                <a:rPr lang="en-US" i="1">
+                                  <a:latin typeface="Cambria Math" panose="02040503050406030204" pitchFamily="18" charset="0"/>
+                                </a:rPr>
                                 <m:t>−</m:t>
                               </m:r>
                               <m:sSubSup>
                                 <m:sSubSupPr>
                                   <m:ctrlPr>
-                                    <a:rPr lang="en-US" i="1"/>
+                                    <a:rPr lang="en-US" i="1">
+                                      <a:latin typeface="Cambria Math" panose="02040503050406030204" pitchFamily="18" charset="0"/>
+                                    </a:rPr>
                                   </m:ctrlPr>
                                 </m:sSubSupPr>
                                 <m:e>
@@ -5230,12 +5241,16 @@
                                     <m:accPr>
                                       <m:chr m:val="̅"/>
                                       <m:ctrlPr>
-                                        <a:rPr lang="en-US" i="1"/>
+                                        <a:rPr lang="en-US" i="1">
+                                          <a:latin typeface="Cambria Math" panose="02040503050406030204" pitchFamily="18" charset="0"/>
+                                        </a:rPr>
                                       </m:ctrlPr>
                                     </m:accPr>
                                     <m:e>
                                       <m:r>
-                                        <a:rPr lang="en-US" i="1"/>
+                                        <a:rPr lang="en-US" i="1">
+                                          <a:latin typeface="Cambria Math" panose="02040503050406030204" pitchFamily="18" charset="0"/>
+                                        </a:rPr>
                                         <m:t>𝑥</m:t>
                                       </m:r>
                                     </m:e>
@@ -5243,13 +5258,17 @@
                                 </m:e>
                                 <m:sub>
                                   <m:r>
-                                    <a:rPr lang="en-US" i="1"/>
+                                    <a:rPr lang="en-US" i="1">
+                                      <a:latin typeface="Cambria Math" panose="02040503050406030204" pitchFamily="18" charset="0"/>
+                                    </a:rPr>
                                     <m:t>𝑇</m:t>
                                   </m:r>
                                 </m:sub>
                                 <m:sup>
                                   <m:r>
-                                    <a:rPr lang="en-US" i="1"/>
+                                    <a:rPr lang="en-US" i="1">
+                                      <a:latin typeface="Cambria Math" panose="02040503050406030204" pitchFamily="18" charset="0"/>
+                                    </a:rPr>
                                     <m:t>h𝑖𝑠𝑡</m:t>
                                   </m:r>
                                 </m:sup>
@@ -5275,11 +5294,11 @@
                   </m:oMath>
                 </a14:m>
                 <a:r>
-                  <a:rPr lang="en-US" i="1" dirty="0" smtClean="0"/>
+                  <a:rPr lang="en-US" i="1" dirty="0"/>
                   <a:t> </a:t>
                 </a:r>
                 <a:r>
-                  <a:rPr lang="en-US" dirty="0" smtClean="0"/>
+                  <a:rPr lang="en-US" dirty="0"/>
                   <a:t>= variable, y = year, T = reference period (2000-2022?)</a:t>
                 </a:r>
               </a:p>
@@ -5289,28 +5308,38 @@
                     <m:sSubSup>
                       <m:sSubSupPr>
                         <m:ctrlPr>
-                          <a:rPr lang="en-US" i="1"/>
+                          <a:rPr lang="en-US" i="1">
+                            <a:latin typeface="Cambria Math" panose="02040503050406030204" pitchFamily="18" charset="0"/>
+                          </a:rPr>
                         </m:ctrlPr>
                       </m:sSubSupPr>
                       <m:e>
                         <m:r>
-                          <a:rPr lang="en-US" i="1"/>
+                          <a:rPr lang="en-US" i="1">
+                            <a:latin typeface="Cambria Math" panose="02040503050406030204" pitchFamily="18" charset="0"/>
+                          </a:rPr>
                           <m:t>𝑥</m:t>
                         </m:r>
                       </m:e>
                       <m:sub>
                         <m:r>
-                          <a:rPr lang="en-US" i="1"/>
+                          <a:rPr lang="en-US" i="1">
+                            <a:latin typeface="Cambria Math" panose="02040503050406030204" pitchFamily="18" charset="0"/>
+                          </a:rPr>
                           <m:t>𝑦</m:t>
                         </m:r>
                       </m:sub>
                       <m:sup>
                         <m:r>
-                          <a:rPr lang="en-US" i="1"/>
+                          <a:rPr lang="en-US" i="1">
+                            <a:latin typeface="Cambria Math" panose="02040503050406030204" pitchFamily="18" charset="0"/>
+                          </a:rPr>
                           <m:t>𝑝𝑟𝑜𝑗</m:t>
                         </m:r>
                         <m:r>
-                          <a:rPr lang="en-US" i="1"/>
+                          <a:rPr lang="en-US" i="1">
+                            <a:latin typeface="Cambria Math" panose="02040503050406030204" pitchFamily="18" charset="0"/>
+                          </a:rPr>
                           <m:t>′</m:t>
                         </m:r>
                       </m:sup>
@@ -5319,24 +5348,12 @@
                 </a14:m>
                 <a:r>
                   <a:rPr lang="en-US" dirty="0"/>
-                  <a:t> </a:t>
-                </a:r>
-                <a:r>
-                  <a:rPr lang="en-US" dirty="0" smtClean="0"/>
-                  <a:t>= bias </a:t>
-                </a:r>
-                <a:r>
-                  <a:rPr lang="en-US" dirty="0"/>
-                  <a:t>corrected </a:t>
-                </a:r>
-                <a:r>
-                  <a:rPr lang="en-US" dirty="0" smtClean="0"/>
-                  <a:t>projection</a:t>
+                  <a:t> = bias corrected projection</a:t>
                 </a:r>
               </a:p>
               <a:p>
                 <a:r>
-                  <a:rPr lang="en-US" dirty="0" smtClean="0"/>
+                  <a:rPr lang="en-US" dirty="0"/>
                   <a:t> </a:t>
                 </a:r>
                 <a14:m>
@@ -5344,7 +5361,9 @@
                     <m:sSubSup>
                       <m:sSubSupPr>
                         <m:ctrlPr>
-                          <a:rPr lang="en-US" i="1"/>
+                          <a:rPr lang="en-US" i="1">
+                            <a:latin typeface="Cambria Math" panose="02040503050406030204" pitchFamily="18" charset="0"/>
+                          </a:rPr>
                         </m:ctrlPr>
                       </m:sSubSupPr>
                       <m:e>
@@ -5352,12 +5371,16 @@
                           <m:accPr>
                             <m:chr m:val="̅"/>
                             <m:ctrlPr>
-                              <a:rPr lang="en-US" i="1"/>
+                              <a:rPr lang="en-US" i="1">
+                                <a:latin typeface="Cambria Math" panose="02040503050406030204" pitchFamily="18" charset="0"/>
+                              </a:rPr>
                             </m:ctrlPr>
                           </m:accPr>
                           <m:e>
                             <m:r>
-                              <a:rPr lang="en-US" i="1"/>
+                              <a:rPr lang="en-US" i="1">
+                                <a:latin typeface="Cambria Math" panose="02040503050406030204" pitchFamily="18" charset="0"/>
+                              </a:rPr>
                               <m:t>𝑥</m:t>
                             </m:r>
                           </m:e>
@@ -5365,13 +5388,17 @@
                       </m:e>
                       <m:sub>
                         <m:r>
-                          <a:rPr lang="en-US" i="1"/>
+                          <a:rPr lang="en-US" i="1">
+                            <a:latin typeface="Cambria Math" panose="02040503050406030204" pitchFamily="18" charset="0"/>
+                          </a:rPr>
                           <m:t>𝑇</m:t>
                         </m:r>
                       </m:sub>
                       <m:sup>
                         <m:r>
-                          <a:rPr lang="en-US" i="1"/>
+                          <a:rPr lang="en-US" i="1">
+                            <a:latin typeface="Cambria Math" panose="02040503050406030204" pitchFamily="18" charset="0"/>
+                          </a:rPr>
                           <m:t>h𝑖𝑛𝑑</m:t>
                         </m:r>
                       </m:sup>
@@ -5380,15 +5407,7 @@
                 </a14:m>
                 <a:r>
                   <a:rPr lang="en-US" dirty="0"/>
-                  <a:t> </a:t>
-                </a:r>
-                <a:r>
-                  <a:rPr lang="en-US" dirty="0" smtClean="0"/>
-                  <a:t>= </a:t>
-                </a:r>
-                <a:r>
-                  <a:rPr lang="en-US" dirty="0"/>
-                  <a:t>the average value of the </a:t>
+                  <a:t> = the average value of the </a:t>
                 </a:r>
                 <a:r>
                   <a:rPr lang="en-US" dirty="0" err="1"/>
@@ -5398,7 +5417,6 @@
                   <a:rPr lang="en-US" dirty="0"/>
                   <a:t> </a:t>
                 </a:r>
-                <a:endParaRPr lang="en-US" dirty="0" smtClean="0"/>
               </a:p>
               <a:p>
                 <a14:m>
@@ -5406,24 +5424,32 @@
                     <m:sSubSup>
                       <m:sSubSupPr>
                         <m:ctrlPr>
-                          <a:rPr lang="en-US" i="1"/>
+                          <a:rPr lang="en-US" i="1">
+                            <a:latin typeface="Cambria Math" panose="02040503050406030204" pitchFamily="18" charset="0"/>
+                          </a:rPr>
                         </m:ctrlPr>
                       </m:sSubSupPr>
                       <m:e>
                         <m:r>
-                          <a:rPr lang="en-US" i="1"/>
+                          <a:rPr lang="en-US" i="1">
+                            <a:latin typeface="Cambria Math" panose="02040503050406030204" pitchFamily="18" charset="0"/>
+                          </a:rPr>
                           <m:t>𝜎</m:t>
                         </m:r>
                       </m:e>
                       <m:sub>
                         <m:r>
-                          <a:rPr lang="en-US" i="1"/>
+                          <a:rPr lang="en-US" i="1">
+                            <a:latin typeface="Cambria Math" panose="02040503050406030204" pitchFamily="18" charset="0"/>
+                          </a:rPr>
                           <m:t>𝑇</m:t>
                         </m:r>
                       </m:sub>
                       <m:sup>
                         <m:r>
-                          <a:rPr lang="en-US" i="1"/>
+                          <a:rPr lang="en-US" i="1">
+                            <a:latin typeface="Cambria Math" panose="02040503050406030204" pitchFamily="18" charset="0"/>
+                          </a:rPr>
                           <m:t>h𝑖𝑛𝑑</m:t>
                         </m:r>
                       </m:sup>
@@ -5432,15 +5458,7 @@
                 </a14:m>
                 <a:r>
                   <a:rPr lang="en-US" dirty="0"/>
-                  <a:t> </a:t>
-                </a:r>
-                <a:r>
-                  <a:rPr lang="en-US" dirty="0" smtClean="0"/>
-                  <a:t>= standard </a:t>
-                </a:r>
-                <a:r>
-                  <a:rPr lang="en-US" dirty="0"/>
-                  <a:t>deviation of the </a:t>
+                  <a:t> = standard deviation of the </a:t>
                 </a:r>
                 <a:r>
                   <a:rPr lang="en-US" dirty="0" err="1"/>
@@ -5450,7 +5468,6 @@
                   <a:rPr lang="en-US" dirty="0"/>
                   <a:t> </a:t>
                 </a:r>
-                <a:endParaRPr lang="en-US" dirty="0" smtClean="0"/>
               </a:p>
               <a:p>
                 <a14:m>
@@ -5458,24 +5475,32 @@
                     <m:sSubSup>
                       <m:sSubSupPr>
                         <m:ctrlPr>
-                          <a:rPr lang="en-US" i="1"/>
+                          <a:rPr lang="en-US" i="1">
+                            <a:latin typeface="Cambria Math" panose="02040503050406030204" pitchFamily="18" charset="0"/>
+                          </a:rPr>
                         </m:ctrlPr>
                       </m:sSubSupPr>
                       <m:e>
                         <m:r>
-                          <a:rPr lang="en-US" i="1"/>
+                          <a:rPr lang="en-US" i="1">
+                            <a:latin typeface="Cambria Math" panose="02040503050406030204" pitchFamily="18" charset="0"/>
+                          </a:rPr>
                           <m:t>𝜎</m:t>
                         </m:r>
                       </m:e>
                       <m:sub>
                         <m:r>
-                          <a:rPr lang="en-US" i="1"/>
+                          <a:rPr lang="en-US" i="1">
+                            <a:latin typeface="Cambria Math" panose="02040503050406030204" pitchFamily="18" charset="0"/>
+                          </a:rPr>
                           <m:t>𝑇</m:t>
                         </m:r>
                       </m:sub>
                       <m:sup>
                         <m:r>
-                          <a:rPr lang="en-US" i="1"/>
+                          <a:rPr lang="en-US" i="1">
+                            <a:latin typeface="Cambria Math" panose="02040503050406030204" pitchFamily="18" charset="0"/>
+                          </a:rPr>
                           <m:t>h𝑖𝑠𝑡</m:t>
                         </m:r>
                       </m:sup>
@@ -5484,19 +5509,7 @@
                 </a14:m>
                 <a:r>
                   <a:rPr lang="en-US" dirty="0"/>
-                  <a:t> </a:t>
-                </a:r>
-                <a:r>
-                  <a:rPr lang="en-US" dirty="0" smtClean="0"/>
-                  <a:t>= standard </a:t>
-                </a:r>
-                <a:r>
-                  <a:rPr lang="en-US" dirty="0"/>
-                  <a:t>deviation of the </a:t>
-                </a:r>
-                <a:r>
-                  <a:rPr lang="en-US" dirty="0" smtClean="0"/>
-                  <a:t>historical</a:t>
+                  <a:t> = standard deviation of the historical</a:t>
                 </a:r>
               </a:p>
               <a:p>
@@ -5505,24 +5518,32 @@
                     <m:sSubSup>
                       <m:sSubSupPr>
                         <m:ctrlPr>
-                          <a:rPr lang="en-US" i="1"/>
+                          <a:rPr lang="en-US" i="1">
+                            <a:latin typeface="Cambria Math" panose="02040503050406030204" pitchFamily="18" charset="0"/>
+                          </a:rPr>
                         </m:ctrlPr>
                       </m:sSubSupPr>
                       <m:e>
                         <m:r>
-                          <a:rPr lang="en-US" i="1"/>
+                          <a:rPr lang="en-US" i="1">
+                            <a:latin typeface="Cambria Math" panose="02040503050406030204" pitchFamily="18" charset="0"/>
+                          </a:rPr>
                           <m:t>𝑥</m:t>
                         </m:r>
                       </m:e>
                       <m:sub>
                         <m:r>
-                          <a:rPr lang="en-US" i="1"/>
+                          <a:rPr lang="en-US" i="1">
+                            <a:latin typeface="Cambria Math" panose="02040503050406030204" pitchFamily="18" charset="0"/>
+                          </a:rPr>
                           <m:t>𝑦</m:t>
                         </m:r>
                       </m:sub>
                       <m:sup>
                         <m:r>
-                          <a:rPr lang="en-US" i="1"/>
+                          <a:rPr lang="en-US" i="1">
+                            <a:latin typeface="Cambria Math" panose="02040503050406030204" pitchFamily="18" charset="0"/>
+                          </a:rPr>
                           <m:t>𝑝𝑟𝑜𝑗</m:t>
                         </m:r>
                       </m:sup>
@@ -5531,11 +5552,7 @@
                 </a14:m>
                 <a:r>
                   <a:rPr lang="en-US" dirty="0"/>
-                  <a:t> </a:t>
-                </a:r>
-                <a:r>
-                  <a:rPr lang="en-US" dirty="0" smtClean="0"/>
-                  <a:t>= projection time-series</a:t>
+                  <a:t> = projection time-series</a:t>
                 </a:r>
               </a:p>
               <a:p>
@@ -5544,7 +5561,9 @@
                     <m:sSubSup>
                       <m:sSubSupPr>
                         <m:ctrlPr>
-                          <a:rPr lang="en-US" i="1"/>
+                          <a:rPr lang="en-US" i="1">
+                            <a:latin typeface="Cambria Math" panose="02040503050406030204" pitchFamily="18" charset="0"/>
+                          </a:rPr>
                         </m:ctrlPr>
                       </m:sSubSupPr>
                       <m:e>
@@ -5552,12 +5571,16 @@
                           <m:accPr>
                             <m:chr m:val="̅"/>
                             <m:ctrlPr>
-                              <a:rPr lang="en-US" i="1"/>
+                              <a:rPr lang="en-US" i="1">
+                                <a:latin typeface="Cambria Math" panose="02040503050406030204" pitchFamily="18" charset="0"/>
+                              </a:rPr>
                             </m:ctrlPr>
                           </m:accPr>
                           <m:e>
                             <m:r>
-                              <a:rPr lang="en-US" i="1"/>
+                              <a:rPr lang="en-US" i="1">
+                                <a:latin typeface="Cambria Math" panose="02040503050406030204" pitchFamily="18" charset="0"/>
+                              </a:rPr>
                               <m:t>𝑥</m:t>
                             </m:r>
                           </m:e>
@@ -5565,13 +5588,17 @@
                       </m:e>
                       <m:sub>
                         <m:r>
-                          <a:rPr lang="en-US" i="1"/>
+                          <a:rPr lang="en-US" i="1">
+                            <a:latin typeface="Cambria Math" panose="02040503050406030204" pitchFamily="18" charset="0"/>
+                          </a:rPr>
                           <m:t>𝑇</m:t>
                         </m:r>
                       </m:sub>
                       <m:sup>
                         <m:r>
-                          <a:rPr lang="en-US" i="1"/>
+                          <a:rPr lang="en-US" i="1">
+                            <a:latin typeface="Cambria Math" panose="02040503050406030204" pitchFamily="18" charset="0"/>
+                          </a:rPr>
                           <m:t>h𝑖𝑠𝑡</m:t>
                         </m:r>
                       </m:sup>
@@ -5580,26 +5607,13 @@
                 </a14:m>
                 <a:r>
                   <a:rPr lang="en-US" dirty="0"/>
-                  <a:t> </a:t>
+                  <a:t> = average value of the historical</a:t>
                 </a:r>
-                <a:r>
-                  <a:rPr lang="en-US" dirty="0" smtClean="0"/>
-                  <a:t>= average </a:t>
-                </a:r>
-                <a:r>
-                  <a:rPr lang="en-US" dirty="0"/>
-                  <a:t>value of the </a:t>
-                </a:r>
-                <a:r>
-                  <a:rPr lang="en-US" dirty="0" smtClean="0"/>
-                  <a:t>historical</a:t>
-                </a:r>
-                <a:endParaRPr lang="en-US" dirty="0"/>
               </a:p>
             </p:txBody>
           </p:sp>
         </mc:Choice>
-        <mc:Fallback>
+        <mc:Fallback xmlns="">
           <p:sp>
             <p:nvSpPr>
               <p:cNvPr id="6" name="Content Placeholder 5"/>
@@ -5649,10 +5663,9 @@
           <a:lstStyle/>
           <a:p>
             <a:r>
-              <a:rPr lang="en-US" b="1" dirty="0" smtClean="0"/>
+              <a:rPr lang="en-US" b="1" dirty="0"/>
               <a:t>Delta correction (log?)</a:t>
             </a:r>
-            <a:endParaRPr lang="en-US" b="1" dirty="0"/>
           </a:p>
         </p:txBody>
       </p:sp>
@@ -5660,6 +5673,284 @@
     <p:extLst>
       <p:ext uri="{BB962C8B-B14F-4D97-AF65-F5344CB8AC3E}">
         <p14:creationId xmlns:p14="http://schemas.microsoft.com/office/powerpoint/2010/main" val="2003252998"/>
+      </p:ext>
+    </p:extLst>
+  </p:cSld>
+  <p:clrMapOvr>
+    <a:masterClrMapping/>
+  </p:clrMapOvr>
+</p:sld>
+</file>
+
+<file path=ppt/slides/slide4.xml><?xml version="1.0" encoding="utf-8"?>
+<p:sld xmlns:a="http://schemas.openxmlformats.org/drawingml/2006/main" xmlns:r="http://schemas.openxmlformats.org/officeDocument/2006/relationships" xmlns:p="http://schemas.openxmlformats.org/presentationml/2006/main">
+  <p:cSld>
+    <p:spTree>
+      <p:nvGrpSpPr>
+        <p:cNvPr id="1" name=""/>
+        <p:cNvGrpSpPr/>
+        <p:nvPr/>
+      </p:nvGrpSpPr>
+      <p:grpSpPr>
+        <a:xfrm>
+          <a:off x="0" y="0"/>
+          <a:ext cx="0" cy="0"/>
+          <a:chOff x="0" y="0"/>
+          <a:chExt cx="0" cy="0"/>
+        </a:xfrm>
+      </p:grpSpPr>
+      <p:sp>
+        <p:nvSpPr>
+          <p:cNvPr id="2" name="Title 1">
+            <a:extLst>
+              <a:ext uri="{FF2B5EF4-FFF2-40B4-BE49-F238E27FC236}">
+                <a16:creationId xmlns:a16="http://schemas.microsoft.com/office/drawing/2014/main" id="{2476A287-A87B-AE20-2E68-42E626FD3AB2}"/>
+              </a:ext>
+            </a:extLst>
+          </p:cNvPr>
+          <p:cNvSpPr>
+            <a:spLocks noGrp="1"/>
+          </p:cNvSpPr>
+          <p:nvPr>
+            <p:ph type="title"/>
+          </p:nvPr>
+        </p:nvSpPr>
+        <p:spPr/>
+        <p:txBody>
+          <a:bodyPr/>
+          <a:lstStyle/>
+          <a:p>
+            <a:r>
+              <a:rPr lang="en-US" b="1" dirty="0"/>
+              <a:t>Mapping ROMS to GOA</a:t>
+            </a:r>
+          </a:p>
+        </p:txBody>
+      </p:sp>
+      <p:pic>
+        <p:nvPicPr>
+          <p:cNvPr id="1026" name="Picture 2">
+            <a:extLst>
+              <a:ext uri="{FF2B5EF4-FFF2-40B4-BE49-F238E27FC236}">
+                <a16:creationId xmlns:a16="http://schemas.microsoft.com/office/drawing/2014/main" id="{01C568BA-99C1-2854-A35D-959DB2E696EF}"/>
+              </a:ext>
+            </a:extLst>
+          </p:cNvPr>
+          <p:cNvPicPr>
+            <a:picLocks noChangeAspect="1" noChangeArrowheads="1"/>
+          </p:cNvPicPr>
+          <p:nvPr/>
+        </p:nvPicPr>
+        <p:blipFill rotWithShape="1">
+          <a:blip r:embed="rId2" cstate="print">
+            <a:extLst>
+              <a:ext uri="{28A0092B-C50C-407E-A947-70E740481C1C}">
+                <a14:useLocalDpi xmlns:a14="http://schemas.microsoft.com/office/drawing/2010/main" val="0"/>
+              </a:ext>
+            </a:extLst>
+          </a:blip>
+          <a:srcRect t="6111" b="6909"/>
+          <a:stretch/>
+        </p:blipFill>
+        <p:spPr bwMode="auto">
+          <a:xfrm>
+            <a:off x="628650" y="1372206"/>
+            <a:ext cx="7471719" cy="5415773"/>
+          </a:xfrm>
+          <a:prstGeom prst="rect">
+            <a:avLst/>
+          </a:prstGeom>
+          <a:noFill/>
+          <a:extLst>
+            <a:ext uri="{909E8E84-426E-40DD-AFC4-6F175D3DCCD1}">
+              <a14:hiddenFill xmlns:a14="http://schemas.microsoft.com/office/drawing/2010/main">
+                <a:solidFill>
+                  <a:srgbClr val="FFFFFF"/>
+                </a:solidFill>
+              </a14:hiddenFill>
+            </a:ext>
+          </a:extLst>
+        </p:spPr>
+      </p:pic>
+      <p:sp>
+        <p:nvSpPr>
+          <p:cNvPr id="4" name="TextBox 3">
+            <a:extLst>
+              <a:ext uri="{FF2B5EF4-FFF2-40B4-BE49-F238E27FC236}">
+                <a16:creationId xmlns:a16="http://schemas.microsoft.com/office/drawing/2014/main" id="{C9483817-6DAA-56D6-D6D7-C48BF56E2519}"/>
+              </a:ext>
+            </a:extLst>
+          </p:cNvPr>
+          <p:cNvSpPr txBox="1"/>
+          <p:nvPr/>
+        </p:nvSpPr>
+        <p:spPr>
+          <a:xfrm>
+            <a:off x="3807288" y="1558884"/>
+            <a:ext cx="3606767" cy="923330"/>
+          </a:xfrm>
+          <a:prstGeom prst="rect">
+            <a:avLst/>
+          </a:prstGeom>
+          <a:noFill/>
+        </p:spPr>
+        <p:txBody>
+          <a:bodyPr wrap="square" rtlCol="0">
+            <a:spAutoFit/>
+          </a:bodyPr>
+          <a:lstStyle/>
+          <a:p>
+            <a:r>
+              <a:rPr lang="en-US" dirty="0"/>
+              <a:t>NMFS areas are the common spatial unit for most GOA-CLIM biological models</a:t>
+            </a:r>
+          </a:p>
+        </p:txBody>
+      </p:sp>
+    </p:spTree>
+    <p:extLst>
+      <p:ext uri="{BB962C8B-B14F-4D97-AF65-F5344CB8AC3E}">
+        <p14:creationId xmlns:p14="http://schemas.microsoft.com/office/powerpoint/2010/main" val="2810242034"/>
+      </p:ext>
+    </p:extLst>
+  </p:cSld>
+  <p:clrMapOvr>
+    <a:masterClrMapping/>
+  </p:clrMapOvr>
+</p:sld>
+</file>
+
+<file path=ppt/slides/slide5.xml><?xml version="1.0" encoding="utf-8"?>
+<p:sld xmlns:a="http://schemas.openxmlformats.org/drawingml/2006/main" xmlns:r="http://schemas.openxmlformats.org/officeDocument/2006/relationships" xmlns:p="http://schemas.openxmlformats.org/presentationml/2006/main">
+  <p:cSld>
+    <p:spTree>
+      <p:nvGrpSpPr>
+        <p:cNvPr id="1" name=""/>
+        <p:cNvGrpSpPr/>
+        <p:nvPr/>
+      </p:nvGrpSpPr>
+      <p:grpSpPr>
+        <a:xfrm>
+          <a:off x="0" y="0"/>
+          <a:ext cx="0" cy="0"/>
+          <a:chOff x="0" y="0"/>
+          <a:chExt cx="0" cy="0"/>
+        </a:xfrm>
+      </p:grpSpPr>
+      <p:sp>
+        <p:nvSpPr>
+          <p:cNvPr id="2" name="Title 1">
+            <a:extLst>
+              <a:ext uri="{FF2B5EF4-FFF2-40B4-BE49-F238E27FC236}">
+                <a16:creationId xmlns:a16="http://schemas.microsoft.com/office/drawing/2014/main" id="{2476A287-A87B-AE20-2E68-42E626FD3AB2}"/>
+              </a:ext>
+            </a:extLst>
+          </p:cNvPr>
+          <p:cNvSpPr>
+            <a:spLocks noGrp="1"/>
+          </p:cNvSpPr>
+          <p:nvPr>
+            <p:ph type="title"/>
+          </p:nvPr>
+        </p:nvSpPr>
+        <p:spPr/>
+        <p:txBody>
+          <a:bodyPr/>
+          <a:lstStyle/>
+          <a:p>
+            <a:r>
+              <a:rPr lang="en-US" b="1" dirty="0"/>
+              <a:t>Mapping ROMS to GOA</a:t>
+            </a:r>
+          </a:p>
+        </p:txBody>
+      </p:sp>
+      <p:pic>
+        <p:nvPicPr>
+          <p:cNvPr id="2050" name="Picture 2">
+            <a:extLst>
+              <a:ext uri="{FF2B5EF4-FFF2-40B4-BE49-F238E27FC236}">
+                <a16:creationId xmlns:a16="http://schemas.microsoft.com/office/drawing/2014/main" id="{EA3415F5-EC0C-A30B-8AAD-A96AD1F0DD4A}"/>
+              </a:ext>
+            </a:extLst>
+          </p:cNvPr>
+          <p:cNvPicPr>
+            <a:picLocks noChangeAspect="1" noChangeArrowheads="1"/>
+          </p:cNvPicPr>
+          <p:nvPr/>
+        </p:nvPicPr>
+        <p:blipFill>
+          <a:blip r:embed="rId2" cstate="print">
+            <a:extLst>
+              <a:ext uri="{28A0092B-C50C-407E-A947-70E740481C1C}">
+                <a14:useLocalDpi xmlns:a14="http://schemas.microsoft.com/office/drawing/2010/main" val="0"/>
+              </a:ext>
+            </a:extLst>
+          </a:blip>
+          <a:srcRect/>
+          <a:stretch>
+            <a:fillRect/>
+          </a:stretch>
+        </p:blipFill>
+        <p:spPr bwMode="auto">
+          <a:xfrm>
+            <a:off x="0" y="2286000"/>
+            <a:ext cx="9144000" cy="4572000"/>
+          </a:xfrm>
+          <a:prstGeom prst="rect">
+            <a:avLst/>
+          </a:prstGeom>
+          <a:noFill/>
+          <a:extLst>
+            <a:ext uri="{909E8E84-426E-40DD-AFC4-6F175D3DCCD1}">
+              <a14:hiddenFill xmlns:a14="http://schemas.microsoft.com/office/drawing/2010/main">
+                <a:solidFill>
+                  <a:srgbClr val="FFFFFF"/>
+                </a:solidFill>
+              </a14:hiddenFill>
+            </a:ext>
+          </a:extLst>
+        </p:spPr>
+      </p:pic>
+      <p:sp>
+        <p:nvSpPr>
+          <p:cNvPr id="3" name="TextBox 2">
+            <a:extLst>
+              <a:ext uri="{FF2B5EF4-FFF2-40B4-BE49-F238E27FC236}">
+                <a16:creationId xmlns:a16="http://schemas.microsoft.com/office/drawing/2014/main" id="{3D720D9A-C884-5713-92A7-1909C75F4DCB}"/>
+              </a:ext>
+            </a:extLst>
+          </p:cNvPr>
+          <p:cNvSpPr txBox="1"/>
+          <p:nvPr/>
+        </p:nvSpPr>
+        <p:spPr>
+          <a:xfrm>
+            <a:off x="271849" y="1803678"/>
+            <a:ext cx="3855927" cy="369332"/>
+          </a:xfrm>
+          <a:prstGeom prst="rect">
+            <a:avLst/>
+          </a:prstGeom>
+          <a:noFill/>
+        </p:spPr>
+        <p:txBody>
+          <a:bodyPr wrap="none" rtlCol="0">
+            <a:spAutoFit/>
+          </a:bodyPr>
+          <a:lstStyle/>
+          <a:p>
+            <a:r>
+              <a:rPr lang="en-US" dirty="0"/>
+              <a:t>Cropping to depths &lt; 1000 m (ROMS h)</a:t>
+            </a:r>
+          </a:p>
+        </p:txBody>
+      </p:sp>
+    </p:spTree>
+    <p:extLst>
+      <p:ext uri="{BB962C8B-B14F-4D97-AF65-F5344CB8AC3E}">
+        <p14:creationId xmlns:p14="http://schemas.microsoft.com/office/powerpoint/2010/main" val="1439827026"/>
       </p:ext>
     </p:extLst>
   </p:cSld>

</xml_diff>